<commit_message>
Added link to code(s).
</commit_message>
<xml_diff>
--- a/slides.pptx
+++ b/slides.pptx
@@ -3141,7 +3141,7 @@
         <p:spPr>
           <a:xfrm>
             <a:off x="3128774" y="920088"/>
-            <a:ext cx="5646658" cy="5017824"/>
+            <a:ext cx="4930457" cy="4381383"/>
           </a:xfrm>
           <a:prstGeom prst="rect">
             <a:avLst/>
@@ -3159,8 +3159,8 @@
         </p:nvSpPr>
         <p:spPr>
           <a:xfrm>
-            <a:off x="1942136" y="5631496"/>
-            <a:ext cx="6580527" cy="878208"/>
+            <a:off x="1959258" y="5047296"/>
+            <a:ext cx="7269489" cy="1610121"/>
           </a:xfrm>
           <a:prstGeom prst="rect">
             <a:avLst/>
@@ -3233,14 +3233,122 @@
               <a:t>	</a:t>
             </a:r>
             <a:r>
+              <a:rPr u="sng">
+                <a:solidFill>
+                  <a:srgbClr val="0000FF"/>
+                </a:solidFill>
+                <a:uFill>
+                  <a:solidFill>
+                    <a:srgbClr val="0000FF"/>
+                  </a:solidFill>
+                </a:uFill>
+                <a:latin typeface="Arial"/>
+                <a:ea typeface="Arial"/>
+                <a:cs typeface="Arial"/>
+                <a:sym typeface="Arial"/>
+                <a:hlinkClick r:id="rId3" invalidUrl="" action="" tgtFrame="" tooltip="" history="1" highlightClick="0" endSnd="0"/>
+              </a:rPr>
+              <a:t>github.com/asantucci/Python-Workshop/blob/main/slides.pptx</a:t>
+            </a:r>
+            <a:endParaRPr sz="1100">
+              <a:latin typeface="Courier"/>
+              <a:ea typeface="Courier"/>
+              <a:cs typeface="Courier"/>
+              <a:sym typeface="Courier"/>
+            </a:endParaRPr>
+          </a:p>
+          <a:p>
+            <a:pPr lvl="1" defTabSz="859536">
+              <a:lnSpc>
+                <a:spcPct val="80000"/>
+              </a:lnSpc>
+              <a:spcBef>
+                <a:spcPts val="400"/>
+              </a:spcBef>
+              <a:buClr>
+                <a:srgbClr val="000000"/>
+              </a:buClr>
+              <a:buFont typeface="Arial"/>
+              <a:defRPr sz="1800"/>
+            </a:pPr>
+            <a:r>
+              <a:rPr sz="1900">
+                <a:latin typeface="Arial Bold"/>
+                <a:ea typeface="Arial Bold"/>
+                <a:cs typeface="Arial Bold"/>
+                <a:sym typeface="Arial Bold"/>
+              </a:rPr>
+              <a:t>Code(s)</a:t>
+            </a:r>
+            <a:endParaRPr b="1" sz="1100">
+              <a:latin typeface="Courier"/>
+              <a:ea typeface="Courier"/>
+              <a:cs typeface="Courier"/>
+              <a:sym typeface="Courier"/>
+            </a:endParaRPr>
+          </a:p>
+          <a:p>
+            <a:pPr lvl="1" defTabSz="859536">
+              <a:lnSpc>
+                <a:spcPct val="80000"/>
+              </a:lnSpc>
+              <a:spcBef>
+                <a:spcPts val="400"/>
+              </a:spcBef>
+              <a:buClr>
+                <a:srgbClr val="000000"/>
+              </a:buClr>
+              <a:buFont typeface="Arial"/>
+              <a:defRPr sz="1800"/>
+            </a:pPr>
+            <a:r>
               <a:rPr sz="1100">
                 <a:latin typeface="Courier"/>
                 <a:ea typeface="Courier"/>
                 <a:cs typeface="Courier"/>
                 <a:sym typeface="Courier"/>
               </a:rPr>
-              <a:t>https://github.com/asantucci/Python-Workshop/blob/main/slides.pptx</a:t>
-            </a:r>
+              <a:t>	</a:t>
+            </a:r>
+            <a:r>
+              <a:rPr u="sng">
+                <a:solidFill>
+                  <a:srgbClr val="0000FF"/>
+                </a:solidFill>
+                <a:uFill>
+                  <a:solidFill>
+                    <a:srgbClr val="0000FF"/>
+                  </a:solidFill>
+                </a:uFill>
+                <a:latin typeface="Arial"/>
+                <a:ea typeface="Arial"/>
+                <a:cs typeface="Arial"/>
+                <a:sym typeface="Arial"/>
+                <a:hlinkClick r:id="rId4" invalidUrl="" action="" tgtFrame="" tooltip="" history="1" highlightClick="0" endSnd="0"/>
+              </a:rPr>
+              <a:t>github.com/asantucci/Python-Workshop</a:t>
+            </a:r>
+            <a:endParaRPr sz="1100">
+              <a:latin typeface="Courier"/>
+              <a:ea typeface="Courier"/>
+              <a:cs typeface="Courier"/>
+              <a:sym typeface="Courier"/>
+            </a:endParaRPr>
+          </a:p>
+          <a:p>
+            <a:pPr lvl="1" defTabSz="859536">
+              <a:lnSpc>
+                <a:spcPct val="80000"/>
+              </a:lnSpc>
+              <a:spcBef>
+                <a:spcPts val="400"/>
+              </a:spcBef>
+              <a:buClr>
+                <a:srgbClr val="000000"/>
+              </a:buClr>
+              <a:buFont typeface="Arial"/>
+              <a:defRPr sz="1800"/>
+            </a:pPr>
             <a:endParaRPr sz="1100">
               <a:latin typeface="Courier"/>
               <a:ea typeface="Courier"/>
@@ -3257,7 +3365,7 @@
           <p:nvPr/>
         </p:nvPicPr>
         <p:blipFill>
-          <a:blip r:embed="rId3">
+          <a:blip r:embed="rId5">
             <a:extLst/>
           </a:blip>
           <a:stretch>
@@ -12981,11 +13089,11 @@
     <p:bldLst>
       <p:bldP build="whole" bldLvl="1" animBg="1" rev="0" advAuto="0" spid="165" grpId="5"/>
       <p:bldP build="whole" bldLvl="1" animBg="1" rev="0" advAuto="0" spid="163" grpId="3"/>
+      <p:bldP build="whole" bldLvl="1" animBg="1" rev="0" advAuto="0" spid="166" grpId="6"/>
+      <p:bldP build="whole" bldLvl="1" animBg="1" rev="0" advAuto="0" spid="161" grpId="2"/>
+      <p:bldP build="whole" bldLvl="1" animBg="1" rev="0" advAuto="0" spid="162" grpId="1"/>
+      <p:bldP build="whole" bldLvl="1" animBg="1" rev="0" advAuto="0" spid="167" grpId="7"/>
       <p:bldP build="whole" bldLvl="1" animBg="1" rev="0" advAuto="0" spid="164" grpId="4"/>
-      <p:bldP build="whole" bldLvl="1" animBg="1" rev="0" advAuto="0" spid="161" grpId="2"/>
-      <p:bldP build="whole" bldLvl="1" animBg="1" rev="0" advAuto="0" spid="166" grpId="6"/>
-      <p:bldP build="whole" bldLvl="1" animBg="1" rev="0" advAuto="0" spid="167" grpId="7"/>
-      <p:bldP build="whole" bldLvl="1" animBg="1" rev="0" advAuto="0" spid="162" grpId="1"/>
     </p:bldLst>
   </p:timing>
 </p:sld>
@@ -14318,10 +14426,10 @@
       </p:par>
     </p:tnLst>
     <p:bldLst>
+      <p:bldP build="whole" bldLvl="1" animBg="1" rev="0" advAuto="0" spid="181" grpId="4"/>
       <p:bldP build="whole" bldLvl="1" animBg="1" rev="0" advAuto="0" spid="175" grpId="2"/>
-      <p:bldP build="whole" bldLvl="1" animBg="1" rev="0" advAuto="0" spid="181" grpId="4"/>
+      <p:bldP build="whole" bldLvl="1" animBg="1" rev="0" advAuto="0" spid="174" grpId="1"/>
       <p:bldP build="whole" bldLvl="1" animBg="1" rev="0" advAuto="0" spid="180" grpId="3"/>
-      <p:bldP build="whole" bldLvl="1" animBg="1" rev="0" advAuto="0" spid="174" grpId="1"/>
     </p:bldLst>
   </p:timing>
 </p:sld>
@@ -17606,15 +17714,15 @@
       </p:par>
     </p:tnLst>
     <p:bldLst>
+      <p:bldP build="whole" bldLvl="1" animBg="1" rev="0" advAuto="0" spid="195" grpId="6"/>
+      <p:bldP build="whole" bldLvl="1" animBg="1" rev="0" advAuto="0" spid="194" grpId="5"/>
+      <p:bldP build="whole" bldLvl="1" animBg="1" rev="0" advAuto="0" spid="185" grpId="1"/>
+      <p:bldP build="whole" bldLvl="1" animBg="1" rev="0" advAuto="0" spid="193" grpId="4"/>
+      <p:bldP build="whole" bldLvl="1" animBg="1" rev="0" advAuto="0" spid="192" grpId="3"/>
       <p:bldP build="whole" bldLvl="1" animBg="1" rev="0" advAuto="0" spid="196" grpId="7"/>
       <p:bldP build="whole" bldLvl="1" animBg="1" rev="0" advAuto="0" spid="197" grpId="8"/>
       <p:bldP build="whole" bldLvl="1" animBg="1" rev="0" advAuto="0" spid="198" grpId="9"/>
-      <p:bldP build="whole" bldLvl="1" animBg="1" rev="0" advAuto="0" spid="195" grpId="6"/>
       <p:bldP build="whole" bldLvl="1" animBg="1" rev="0" advAuto="0" spid="191" grpId="2"/>
-      <p:bldP build="whole" bldLvl="1" animBg="1" rev="0" advAuto="0" spid="193" grpId="4"/>
-      <p:bldP build="whole" bldLvl="1" animBg="1" rev="0" advAuto="0" spid="185" grpId="1"/>
-      <p:bldP build="whole" bldLvl="1" animBg="1" rev="0" advAuto="0" spid="192" grpId="3"/>
-      <p:bldP build="whole" bldLvl="1" animBg="1" rev="0" advAuto="0" spid="194" grpId="5"/>
     </p:bldLst>
   </p:timing>
 </p:sld>

</xml_diff>